<commit_message>
Class 06 added - first semester finished
</commit_message>
<xml_diff>
--- a/Aula 05/Aula 05.pptx
+++ b/Aula 05/Aula 05.pptx
@@ -218,7 +218,7 @@
             <a:fld id="{CDA8A7F6-3914-469C-A6E9-40923DB352E9}" type="datetimeFigureOut">
               <a:rPr lang="pt-BR" smtClean="0"/>
               <a:pPr/>
-              <a:t>06/10/2014</a:t>
+              <a:t>19/10/2014</a:t>
             </a:fld>
             <a:endParaRPr lang="pt-BR"/>
           </a:p>
@@ -1115,7 +1115,7 @@
             <a:fld id="{F3B9BC5B-4239-48BA-91AF-B1A90F2D50F7}" type="datetimeFigureOut">
               <a:rPr lang="pt-BR" smtClean="0"/>
               <a:pPr/>
-              <a:t>06/10/2014</a:t>
+              <a:t>19/10/2014</a:t>
             </a:fld>
             <a:endParaRPr lang="pt-BR"/>
           </a:p>
@@ -1313,7 +1313,7 @@
             <a:fld id="{F3B9BC5B-4239-48BA-91AF-B1A90F2D50F7}" type="datetimeFigureOut">
               <a:rPr lang="pt-BR" smtClean="0"/>
               <a:pPr/>
-              <a:t>06/10/2014</a:t>
+              <a:t>19/10/2014</a:t>
             </a:fld>
             <a:endParaRPr lang="pt-BR"/>
           </a:p>
@@ -1500,7 +1500,7 @@
             <a:fld id="{F3B9BC5B-4239-48BA-91AF-B1A90F2D50F7}" type="datetimeFigureOut">
               <a:rPr lang="pt-BR" smtClean="0"/>
               <a:pPr/>
-              <a:t>06/10/2014</a:t>
+              <a:t>19/10/2014</a:t>
             </a:fld>
             <a:endParaRPr lang="pt-BR"/>
           </a:p>
@@ -1652,7 +1652,7 @@
             <a:fld id="{F3B9BC5B-4239-48BA-91AF-B1A90F2D50F7}" type="datetimeFigureOut">
               <a:rPr lang="pt-BR" smtClean="0"/>
               <a:pPr/>
-              <a:t>06/10/2014</a:t>
+              <a:t>19/10/2014</a:t>
             </a:fld>
             <a:endParaRPr lang="pt-BR"/>
           </a:p>
@@ -1909,7 +1909,7 @@
             <a:fld id="{F3B9BC5B-4239-48BA-91AF-B1A90F2D50F7}" type="datetimeFigureOut">
               <a:rPr lang="pt-BR" smtClean="0"/>
               <a:pPr/>
-              <a:t>06/10/2014</a:t>
+              <a:t>19/10/2014</a:t>
             </a:fld>
             <a:endParaRPr lang="pt-BR"/>
           </a:p>
@@ -2320,7 +2320,7 @@
             <a:fld id="{F3B9BC5B-4239-48BA-91AF-B1A90F2D50F7}" type="datetimeFigureOut">
               <a:rPr lang="pt-BR" smtClean="0"/>
               <a:pPr/>
-              <a:t>06/10/2014</a:t>
+              <a:t>19/10/2014</a:t>
             </a:fld>
             <a:endParaRPr lang="pt-BR"/>
           </a:p>
@@ -2768,7 +2768,7 @@
             <a:fld id="{F3B9BC5B-4239-48BA-91AF-B1A90F2D50F7}" type="datetimeFigureOut">
               <a:rPr lang="pt-BR" smtClean="0"/>
               <a:pPr/>
-              <a:t>06/10/2014</a:t>
+              <a:t>19/10/2014</a:t>
             </a:fld>
             <a:endParaRPr lang="pt-BR"/>
           </a:p>
@@ -2871,7 +2871,7 @@
             <a:fld id="{F3B9BC5B-4239-48BA-91AF-B1A90F2D50F7}" type="datetimeFigureOut">
               <a:rPr lang="pt-BR" smtClean="0"/>
               <a:pPr/>
-              <a:t>06/10/2014</a:t>
+              <a:t>19/10/2014</a:t>
             </a:fld>
             <a:endParaRPr lang="pt-BR"/>
           </a:p>
@@ -2994,7 +2994,7 @@
             <a:fld id="{F3B9BC5B-4239-48BA-91AF-B1A90F2D50F7}" type="datetimeFigureOut">
               <a:rPr lang="pt-BR" smtClean="0"/>
               <a:pPr/>
-              <a:t>06/10/2014</a:t>
+              <a:t>19/10/2014</a:t>
             </a:fld>
             <a:endParaRPr lang="pt-BR"/>
           </a:p>
@@ -3270,7 +3270,7 @@
             <a:fld id="{F3B9BC5B-4239-48BA-91AF-B1A90F2D50F7}" type="datetimeFigureOut">
               <a:rPr lang="pt-BR" smtClean="0"/>
               <a:pPr/>
-              <a:t>06/10/2014</a:t>
+              <a:t>19/10/2014</a:t>
             </a:fld>
             <a:endParaRPr lang="pt-BR"/>
           </a:p>
@@ -3477,7 +3477,7 @@
             <a:fld id="{F3B9BC5B-4239-48BA-91AF-B1A90F2D50F7}" type="datetimeFigureOut">
               <a:rPr lang="pt-BR" smtClean="0"/>
               <a:pPr/>
-              <a:t>06/10/2014</a:t>
+              <a:t>19/10/2014</a:t>
             </a:fld>
             <a:endParaRPr lang="pt-BR"/>
           </a:p>
@@ -4588,7 +4588,7 @@
             <a:fld id="{F3B9BC5B-4239-48BA-91AF-B1A90F2D50F7}" type="datetimeFigureOut">
               <a:rPr lang="pt-BR" smtClean="0"/>
               <a:pPr/>
-              <a:t>06/10/2014</a:t>
+              <a:t>19/10/2014</a:t>
             </a:fld>
             <a:endParaRPr lang="pt-BR"/>
           </a:p>
@@ -5198,13 +5198,10 @@
           </a:p>
           <a:p>
             <a:r>
-              <a:rPr lang="pt-BR" dirty="0" err="1" smtClean="0"/>
-              <a:t>Surprise</a:t>
-            </a:r>
-            <a:r>
               <a:rPr lang="pt-BR" dirty="0" smtClean="0"/>
-              <a:t>!</a:t>
-            </a:r>
+              <a:t>Como não cair da mesa!</a:t>
+            </a:r>
+            <a:endParaRPr lang="pt-BR" dirty="0" smtClean="0"/>
           </a:p>
         </p:txBody>
       </p:sp>

</xml_diff>